<commit_message>
Adds 'humorous' pix to presentation
</commit_message>
<xml_diff>
--- a/Attacks/Session hijacking via MITM.pptx
+++ b/Attacks/Session hijacking via MITM.pptx
@@ -7,14 +7,19 @@
   <p:sldIdLst>
     <p:sldId id="256" r:id="rId2"/>
     <p:sldId id="257" r:id="rId3"/>
-    <p:sldId id="258" r:id="rId4"/>
-    <p:sldId id="259" r:id="rId5"/>
-    <p:sldId id="265" r:id="rId6"/>
-    <p:sldId id="260" r:id="rId7"/>
-    <p:sldId id="261" r:id="rId8"/>
-    <p:sldId id="262" r:id="rId9"/>
-    <p:sldId id="263" r:id="rId10"/>
-    <p:sldId id="264" r:id="rId11"/>
+    <p:sldId id="268" r:id="rId4"/>
+    <p:sldId id="258" r:id="rId5"/>
+    <p:sldId id="269" r:id="rId6"/>
+    <p:sldId id="259" r:id="rId7"/>
+    <p:sldId id="265" r:id="rId8"/>
+    <p:sldId id="260" r:id="rId9"/>
+    <p:sldId id="267" r:id="rId10"/>
+    <p:sldId id="261" r:id="rId11"/>
+    <p:sldId id="266" r:id="rId12"/>
+    <p:sldId id="262" r:id="rId13"/>
+    <p:sldId id="263" r:id="rId14"/>
+    <p:sldId id="270" r:id="rId15"/>
+    <p:sldId id="264" r:id="rId16"/>
   </p:sldIdLst>
   <p:sldSz cx="12192000" cy="6858000"/>
   <p:notesSz cx="6858000" cy="9144000"/>
@@ -113,6 +118,11 @@
       </a:defRPr>
     </a:lvl9pPr>
   </p:defaultTextStyle>
+  <p:extLst>
+    <p:ext uri="{EFAFB233-063F-42B5-8137-9DF3F51BA10A}">
+      <p15:sldGuideLst xmlns:p15="http://schemas.microsoft.com/office/powerpoint/2012/main"/>
+    </p:ext>
+  </p:extLst>
 </p:presentation>
 </file>
 
@@ -247,7 +257,7 @@
           <a:p>
             <a:fld id="{183B8DAC-1B2F-42FF-AD88-17923600ABE0}" type="datetimeFigureOut">
               <a:rPr lang="en-GB" smtClean="0"/>
-              <a:t>01/12/2015</a:t>
+              <a:t>02/12/2015</a:t>
             </a:fld>
             <a:endParaRPr lang="en-GB"/>
           </a:p>
@@ -417,7 +427,7 @@
           <a:p>
             <a:fld id="{183B8DAC-1B2F-42FF-AD88-17923600ABE0}" type="datetimeFigureOut">
               <a:rPr lang="en-GB" smtClean="0"/>
-              <a:t>01/12/2015</a:t>
+              <a:t>02/12/2015</a:t>
             </a:fld>
             <a:endParaRPr lang="en-GB"/>
           </a:p>
@@ -597,7 +607,7 @@
           <a:p>
             <a:fld id="{183B8DAC-1B2F-42FF-AD88-17923600ABE0}" type="datetimeFigureOut">
               <a:rPr lang="en-GB" smtClean="0"/>
-              <a:t>01/12/2015</a:t>
+              <a:t>02/12/2015</a:t>
             </a:fld>
             <a:endParaRPr lang="en-GB"/>
           </a:p>
@@ -767,7 +777,7 @@
           <a:p>
             <a:fld id="{183B8DAC-1B2F-42FF-AD88-17923600ABE0}" type="datetimeFigureOut">
               <a:rPr lang="en-GB" smtClean="0"/>
-              <a:t>01/12/2015</a:t>
+              <a:t>02/12/2015</a:t>
             </a:fld>
             <a:endParaRPr lang="en-GB"/>
           </a:p>
@@ -1013,7 +1023,7 @@
           <a:p>
             <a:fld id="{183B8DAC-1B2F-42FF-AD88-17923600ABE0}" type="datetimeFigureOut">
               <a:rPr lang="en-GB" smtClean="0"/>
-              <a:t>01/12/2015</a:t>
+              <a:t>02/12/2015</a:t>
             </a:fld>
             <a:endParaRPr lang="en-GB"/>
           </a:p>
@@ -1245,7 +1255,7 @@
           <a:p>
             <a:fld id="{183B8DAC-1B2F-42FF-AD88-17923600ABE0}" type="datetimeFigureOut">
               <a:rPr lang="en-GB" smtClean="0"/>
-              <a:t>01/12/2015</a:t>
+              <a:t>02/12/2015</a:t>
             </a:fld>
             <a:endParaRPr lang="en-GB"/>
           </a:p>
@@ -1612,7 +1622,7 @@
           <a:p>
             <a:fld id="{183B8DAC-1B2F-42FF-AD88-17923600ABE0}" type="datetimeFigureOut">
               <a:rPr lang="en-GB" smtClean="0"/>
-              <a:t>01/12/2015</a:t>
+              <a:t>02/12/2015</a:t>
             </a:fld>
             <a:endParaRPr lang="en-GB"/>
           </a:p>
@@ -1730,7 +1740,7 @@
           <a:p>
             <a:fld id="{183B8DAC-1B2F-42FF-AD88-17923600ABE0}" type="datetimeFigureOut">
               <a:rPr lang="en-GB" smtClean="0"/>
-              <a:t>01/12/2015</a:t>
+              <a:t>02/12/2015</a:t>
             </a:fld>
             <a:endParaRPr lang="en-GB"/>
           </a:p>
@@ -1825,7 +1835,7 @@
           <a:p>
             <a:fld id="{183B8DAC-1B2F-42FF-AD88-17923600ABE0}" type="datetimeFigureOut">
               <a:rPr lang="en-GB" smtClean="0"/>
-              <a:t>01/12/2015</a:t>
+              <a:t>02/12/2015</a:t>
             </a:fld>
             <a:endParaRPr lang="en-GB"/>
           </a:p>
@@ -2102,7 +2112,7 @@
           <a:p>
             <a:fld id="{183B8DAC-1B2F-42FF-AD88-17923600ABE0}" type="datetimeFigureOut">
               <a:rPr lang="en-GB" smtClean="0"/>
-              <a:t>01/12/2015</a:t>
+              <a:t>02/12/2015</a:t>
             </a:fld>
             <a:endParaRPr lang="en-GB"/>
           </a:p>
@@ -2355,7 +2365,7 @@
           <a:p>
             <a:fld id="{183B8DAC-1B2F-42FF-AD88-17923600ABE0}" type="datetimeFigureOut">
               <a:rPr lang="en-GB" smtClean="0"/>
-              <a:t>01/12/2015</a:t>
+              <a:t>02/12/2015</a:t>
             </a:fld>
             <a:endParaRPr lang="en-GB"/>
           </a:p>
@@ -2568,7 +2578,7 @@
           <a:p>
             <a:fld id="{183B8DAC-1B2F-42FF-AD88-17923600ABE0}" type="datetimeFigureOut">
               <a:rPr lang="en-GB" smtClean="0"/>
-              <a:t>01/12/2015</a:t>
+              <a:t>02/12/2015</a:t>
             </a:fld>
             <a:endParaRPr lang="en-GB"/>
           </a:p>
@@ -3080,6 +3090,573 @@
           <a:p>
             <a:r>
               <a:rPr lang="en-GB" dirty="0" smtClean="0"/>
+              <a:t>I’m a developer. Is it all my fault?</a:t>
+            </a:r>
+            <a:endParaRPr lang="en-GB" dirty="0"/>
+          </a:p>
+        </p:txBody>
+      </p:sp>
+      <p:sp>
+        <p:nvSpPr>
+          <p:cNvPr id="3" name="Content Placeholder 2"/>
+          <p:cNvSpPr>
+            <a:spLocks noGrp="1"/>
+          </p:cNvSpPr>
+          <p:nvPr>
+            <p:ph idx="1"/>
+          </p:nvPr>
+        </p:nvSpPr>
+        <p:spPr/>
+        <p:txBody>
+          <a:bodyPr>
+            <a:noAutofit/>
+          </a:bodyPr>
+          <a:lstStyle/>
+          <a:p>
+            <a:pPr marL="0" indent="0">
+              <a:buNone/>
+            </a:pPr>
+            <a:r>
+              <a:rPr lang="en-GB" sz="4000" dirty="0" smtClean="0"/>
+              <a:t>Yes it is (mostly) - these problems exist because of weak application security.</a:t>
+            </a:r>
+          </a:p>
+          <a:p>
+            <a:r>
+              <a:rPr lang="en-GB" sz="4000" dirty="0" smtClean="0"/>
+              <a:t>We need to understand how to design them out.</a:t>
+            </a:r>
+          </a:p>
+          <a:p>
+            <a:r>
+              <a:rPr lang="en-GB" sz="4000" dirty="0" smtClean="0"/>
+              <a:t>We need to know how to review and test for them.</a:t>
+            </a:r>
+          </a:p>
+          <a:p>
+            <a:r>
+              <a:rPr lang="en-GB" sz="4000" dirty="0" smtClean="0"/>
+              <a:t>We need to think of our apps as targets, like a hacker does.</a:t>
+            </a:r>
+            <a:endParaRPr lang="en-GB" sz="4000" dirty="0"/>
+          </a:p>
+        </p:txBody>
+      </p:sp>
+    </p:spTree>
+    <p:extLst>
+      <p:ext uri="{BB962C8B-B14F-4D97-AF65-F5344CB8AC3E}">
+        <p14:creationId xmlns:p14="http://schemas.microsoft.com/office/powerpoint/2010/main" val="4131744087"/>
+      </p:ext>
+    </p:extLst>
+  </p:cSld>
+  <p:clrMapOvr>
+    <a:masterClrMapping/>
+  </p:clrMapOvr>
+</p:sld>
+</file>
+
+<file path=ppt/slides/slide11.xml><?xml version="1.0" encoding="utf-8"?>
+<p:sld xmlns:a="http://schemas.openxmlformats.org/drawingml/2006/main" xmlns:r="http://schemas.openxmlformats.org/officeDocument/2006/relationships" xmlns:p="http://schemas.openxmlformats.org/presentationml/2006/main">
+  <p:cSld>
+    <p:spTree>
+      <p:nvGrpSpPr>
+        <p:cNvPr id="1" name=""/>
+        <p:cNvGrpSpPr/>
+        <p:nvPr/>
+      </p:nvGrpSpPr>
+      <p:grpSpPr>
+        <a:xfrm>
+          <a:off x="0" y="0"/>
+          <a:ext cx="0" cy="0"/>
+          <a:chOff x="0" y="0"/>
+          <a:chExt cx="0" cy="0"/>
+        </a:xfrm>
+      </p:grpSpPr>
+      <p:pic>
+        <p:nvPicPr>
+          <p:cNvPr id="2" name="Picture 1"/>
+          <p:cNvPicPr>
+            <a:picLocks noChangeAspect="1"/>
+          </p:cNvPicPr>
+          <p:nvPr/>
+        </p:nvPicPr>
+        <p:blipFill>
+          <a:blip r:embed="rId2"/>
+          <a:stretch>
+            <a:fillRect/>
+          </a:stretch>
+        </p:blipFill>
+        <p:spPr>
+          <a:xfrm>
+            <a:off x="1899557" y="2100943"/>
+            <a:ext cx="4098471" cy="2732314"/>
+          </a:xfrm>
+          <a:prstGeom prst="rect">
+            <a:avLst/>
+          </a:prstGeom>
+        </p:spPr>
+      </p:pic>
+      <p:pic>
+        <p:nvPicPr>
+          <p:cNvPr id="3" name="Picture 2"/>
+          <p:cNvPicPr>
+            <a:picLocks noChangeAspect="1"/>
+          </p:cNvPicPr>
+          <p:nvPr/>
+        </p:nvPicPr>
+        <p:blipFill>
+          <a:blip r:embed="rId3"/>
+          <a:stretch>
+            <a:fillRect/>
+          </a:stretch>
+        </p:blipFill>
+        <p:spPr>
+          <a:xfrm>
+            <a:off x="8014607" y="2100943"/>
+            <a:ext cx="2076450" cy="2685065"/>
+          </a:xfrm>
+          <a:prstGeom prst="rect">
+            <a:avLst/>
+          </a:prstGeom>
+        </p:spPr>
+      </p:pic>
+      <p:sp>
+        <p:nvSpPr>
+          <p:cNvPr id="4" name="TextBox 3"/>
+          <p:cNvSpPr txBox="1"/>
+          <p:nvPr/>
+        </p:nvSpPr>
+        <p:spPr>
+          <a:xfrm>
+            <a:off x="1750690" y="751115"/>
+            <a:ext cx="4396203" cy="769441"/>
+          </a:xfrm>
+          <a:prstGeom prst="rect">
+            <a:avLst/>
+          </a:prstGeom>
+          <a:noFill/>
+        </p:spPr>
+        <p:txBody>
+          <a:bodyPr wrap="none" rtlCol="0">
+            <a:spAutoFit/>
+          </a:bodyPr>
+          <a:lstStyle/>
+          <a:p>
+            <a:r>
+              <a:rPr lang="en-GB" sz="4400" dirty="0" smtClean="0"/>
+              <a:t>Think like a hacker</a:t>
+            </a:r>
+            <a:endParaRPr lang="en-GB" sz="4400" dirty="0"/>
+          </a:p>
+        </p:txBody>
+      </p:sp>
+      <p:sp>
+        <p:nvSpPr>
+          <p:cNvPr id="5" name="TextBox 4"/>
+          <p:cNvSpPr txBox="1"/>
+          <p:nvPr/>
+        </p:nvSpPr>
+        <p:spPr>
+          <a:xfrm>
+            <a:off x="6570793" y="5334000"/>
+            <a:ext cx="5871578" cy="769441"/>
+          </a:xfrm>
+          <a:prstGeom prst="rect">
+            <a:avLst/>
+          </a:prstGeom>
+          <a:noFill/>
+        </p:spPr>
+        <p:txBody>
+          <a:bodyPr wrap="square" rtlCol="0">
+            <a:spAutoFit/>
+          </a:bodyPr>
+          <a:lstStyle/>
+          <a:p>
+            <a:r>
+              <a:rPr lang="en-GB" sz="4400" dirty="0" smtClean="0"/>
+              <a:t>Study like an Egyptian</a:t>
+            </a:r>
+          </a:p>
+        </p:txBody>
+      </p:sp>
+    </p:spTree>
+    <p:extLst>
+      <p:ext uri="{BB962C8B-B14F-4D97-AF65-F5344CB8AC3E}">
+        <p14:creationId xmlns:p14="http://schemas.microsoft.com/office/powerpoint/2010/main" val="191209505"/>
+      </p:ext>
+    </p:extLst>
+  </p:cSld>
+  <p:clrMapOvr>
+    <a:masterClrMapping/>
+  </p:clrMapOvr>
+</p:sld>
+</file>
+
+<file path=ppt/slides/slide12.xml><?xml version="1.0" encoding="utf-8"?>
+<p:sld xmlns:a="http://schemas.openxmlformats.org/drawingml/2006/main" xmlns:r="http://schemas.openxmlformats.org/officeDocument/2006/relationships" xmlns:p="http://schemas.openxmlformats.org/presentationml/2006/main">
+  <p:cSld>
+    <p:spTree>
+      <p:nvGrpSpPr>
+        <p:cNvPr id="1" name=""/>
+        <p:cNvGrpSpPr/>
+        <p:nvPr/>
+      </p:nvGrpSpPr>
+      <p:grpSpPr>
+        <a:xfrm>
+          <a:off x="0" y="0"/>
+          <a:ext cx="0" cy="0"/>
+          <a:chOff x="0" y="0"/>
+          <a:chExt cx="0" cy="0"/>
+        </a:xfrm>
+      </p:grpSpPr>
+      <p:sp>
+        <p:nvSpPr>
+          <p:cNvPr id="2" name="Title 1"/>
+          <p:cNvSpPr>
+            <a:spLocks noGrp="1"/>
+          </p:cNvSpPr>
+          <p:nvPr>
+            <p:ph type="title"/>
+          </p:nvPr>
+        </p:nvSpPr>
+        <p:spPr/>
+        <p:txBody>
+          <a:bodyPr/>
+          <a:lstStyle/>
+          <a:p>
+            <a:r>
+              <a:rPr lang="en-GB" dirty="0" smtClean="0"/>
+              <a:t>What’s this training going to cover?</a:t>
+            </a:r>
+            <a:endParaRPr lang="en-GB" dirty="0"/>
+          </a:p>
+        </p:txBody>
+      </p:sp>
+      <p:sp>
+        <p:nvSpPr>
+          <p:cNvPr id="3" name="Content Placeholder 2"/>
+          <p:cNvSpPr>
+            <a:spLocks noGrp="1"/>
+          </p:cNvSpPr>
+          <p:nvPr>
+            <p:ph idx="1"/>
+          </p:nvPr>
+        </p:nvSpPr>
+        <p:spPr>
+          <a:xfrm>
+            <a:off x="494521" y="1825625"/>
+            <a:ext cx="11196735" cy="4621828"/>
+          </a:xfrm>
+        </p:spPr>
+        <p:txBody>
+          <a:bodyPr>
+            <a:normAutofit fontScale="92500" lnSpcReduction="10000"/>
+          </a:bodyPr>
+          <a:lstStyle/>
+          <a:p>
+            <a:r>
+              <a:rPr lang="en-GB" sz="3500" dirty="0" smtClean="0"/>
+              <a:t>How the internet works (well, up to a point). </a:t>
+            </a:r>
+          </a:p>
+          <a:p>
+            <a:r>
+              <a:rPr lang="en-GB" sz="3500" dirty="0" smtClean="0"/>
+              <a:t>A couple of ways session management is done, and just how broken it can be. &lt;spoiler: very&gt;</a:t>
+            </a:r>
+          </a:p>
+          <a:p>
+            <a:r>
+              <a:rPr lang="en-GB" sz="3500" dirty="0" smtClean="0"/>
+              <a:t>How to run a session hijack via MITM.</a:t>
+            </a:r>
+          </a:p>
+          <a:p>
+            <a:r>
+              <a:rPr lang="en-GB" sz="3500" dirty="0" smtClean="0"/>
+              <a:t>How to set up tools to test for these vulnerabilities.</a:t>
+            </a:r>
+          </a:p>
+          <a:p>
+            <a:r>
+              <a:rPr lang="en-GB" sz="3500" dirty="0" smtClean="0"/>
+              <a:t>What HTTPS gives you, and how.</a:t>
+            </a:r>
+          </a:p>
+          <a:p>
+            <a:r>
+              <a:rPr lang="en-GB" sz="3500" dirty="0" smtClean="0"/>
+              <a:t>Some simple fixes / mitigations.</a:t>
+            </a:r>
+          </a:p>
+          <a:p>
+            <a:r>
+              <a:rPr lang="en-GB" sz="3500" dirty="0" smtClean="0"/>
+              <a:t>Some less well-known fixes.</a:t>
+            </a:r>
+          </a:p>
+          <a:p>
+            <a:r>
+              <a:rPr lang="en-GB" sz="3500" dirty="0" smtClean="0"/>
+              <a:t>Other stuff.</a:t>
+            </a:r>
+          </a:p>
+          <a:p>
+            <a:endParaRPr lang="en-GB" dirty="0"/>
+          </a:p>
+        </p:txBody>
+      </p:sp>
+    </p:spTree>
+    <p:extLst>
+      <p:ext uri="{BB962C8B-B14F-4D97-AF65-F5344CB8AC3E}">
+        <p14:creationId xmlns:p14="http://schemas.microsoft.com/office/powerpoint/2010/main" val="1973874365"/>
+      </p:ext>
+    </p:extLst>
+  </p:cSld>
+  <p:clrMapOvr>
+    <a:masterClrMapping/>
+  </p:clrMapOvr>
+</p:sld>
+</file>
+
+<file path=ppt/slides/slide13.xml><?xml version="1.0" encoding="utf-8"?>
+<p:sld xmlns:a="http://schemas.openxmlformats.org/drawingml/2006/main" xmlns:r="http://schemas.openxmlformats.org/officeDocument/2006/relationships" xmlns:p="http://schemas.openxmlformats.org/presentationml/2006/main">
+  <p:cSld>
+    <p:spTree>
+      <p:nvGrpSpPr>
+        <p:cNvPr id="1" name=""/>
+        <p:cNvGrpSpPr/>
+        <p:nvPr/>
+      </p:nvGrpSpPr>
+      <p:grpSpPr>
+        <a:xfrm>
+          <a:off x="0" y="0"/>
+          <a:ext cx="0" cy="0"/>
+          <a:chOff x="0" y="0"/>
+          <a:chExt cx="0" cy="0"/>
+        </a:xfrm>
+      </p:grpSpPr>
+      <p:sp>
+        <p:nvSpPr>
+          <p:cNvPr id="2" name="Title 1"/>
+          <p:cNvSpPr>
+            <a:spLocks noGrp="1"/>
+          </p:cNvSpPr>
+          <p:nvPr>
+            <p:ph type="title"/>
+          </p:nvPr>
+        </p:nvSpPr>
+        <p:spPr/>
+        <p:txBody>
+          <a:bodyPr/>
+          <a:lstStyle/>
+          <a:p>
+            <a:r>
+              <a:rPr lang="en-GB" dirty="0" smtClean="0"/>
+              <a:t>How do I use the training material?</a:t>
+            </a:r>
+            <a:endParaRPr lang="en-GB" dirty="0"/>
+          </a:p>
+        </p:txBody>
+      </p:sp>
+      <p:sp>
+        <p:nvSpPr>
+          <p:cNvPr id="3" name="Content Placeholder 2"/>
+          <p:cNvSpPr>
+            <a:spLocks noGrp="1"/>
+          </p:cNvSpPr>
+          <p:nvPr>
+            <p:ph idx="1"/>
+          </p:nvPr>
+        </p:nvSpPr>
+        <p:spPr/>
+        <p:txBody>
+          <a:bodyPr>
+            <a:normAutofit/>
+          </a:bodyPr>
+          <a:lstStyle/>
+          <a:p>
+            <a:r>
+              <a:rPr lang="en-GB" dirty="0" smtClean="0"/>
+              <a:t>It’s hands on. There are a couple of vulnerable sample apps that run in VMs. Hack them then fix them.</a:t>
+            </a:r>
+          </a:p>
+          <a:p>
+            <a:r>
+              <a:rPr lang="en-GB" dirty="0" smtClean="0"/>
+              <a:t>Read the readmes. Read and follow the attack docs (Attacks/*.md).</a:t>
+            </a:r>
+          </a:p>
+          <a:p>
+            <a:r>
+              <a:rPr lang="en-GB" dirty="0" smtClean="0"/>
+              <a:t>Developers: Do the exercises. No, really, you may be surprised.</a:t>
+            </a:r>
+          </a:p>
+          <a:p>
+            <a:r>
+              <a:rPr lang="en-GB" dirty="0" smtClean="0"/>
+              <a:t>Testers: Do the (testing) exercises. We’ll arrange some extra help.</a:t>
+            </a:r>
+          </a:p>
+          <a:p>
+            <a:r>
+              <a:rPr lang="en-GB" dirty="0" smtClean="0"/>
+              <a:t>Everyone: Ask me when you get stuck, point out my errors and gaps. I’m ‘learning by teaching’ here, so please help me learn too </a:t>
+            </a:r>
+            <a:r>
+              <a:rPr lang="en-GB" dirty="0" smtClean="0">
+                <a:sym typeface="Wingdings" panose="05000000000000000000" pitchFamily="2" charset="2"/>
+              </a:rPr>
+              <a:t></a:t>
+            </a:r>
+            <a:r>
+              <a:rPr lang="en-GB" dirty="0" smtClean="0"/>
+              <a:t>.</a:t>
+            </a:r>
+          </a:p>
+          <a:p>
+            <a:r>
+              <a:rPr lang="en-GB" dirty="0" smtClean="0"/>
+              <a:t>Everyone: It’s a git repo. Please improve it by sending pull requests (talk to me first, though).</a:t>
+            </a:r>
+          </a:p>
+          <a:p>
+            <a:endParaRPr lang="en-GB" dirty="0"/>
+          </a:p>
+        </p:txBody>
+      </p:sp>
+    </p:spTree>
+    <p:extLst>
+      <p:ext uri="{BB962C8B-B14F-4D97-AF65-F5344CB8AC3E}">
+        <p14:creationId xmlns:p14="http://schemas.microsoft.com/office/powerpoint/2010/main" val="2643770366"/>
+      </p:ext>
+    </p:extLst>
+  </p:cSld>
+  <p:clrMapOvr>
+    <a:masterClrMapping/>
+  </p:clrMapOvr>
+</p:sld>
+</file>
+
+<file path=ppt/slides/slide14.xml><?xml version="1.0" encoding="utf-8"?>
+<p:sld xmlns:a="http://schemas.openxmlformats.org/drawingml/2006/main" xmlns:r="http://schemas.openxmlformats.org/officeDocument/2006/relationships" xmlns:p="http://schemas.openxmlformats.org/presentationml/2006/main">
+  <p:cSld>
+    <p:spTree>
+      <p:nvGrpSpPr>
+        <p:cNvPr id="1" name=""/>
+        <p:cNvGrpSpPr/>
+        <p:nvPr/>
+      </p:nvGrpSpPr>
+      <p:grpSpPr>
+        <a:xfrm>
+          <a:off x="0" y="0"/>
+          <a:ext cx="0" cy="0"/>
+          <a:chOff x="0" y="0"/>
+          <a:chExt cx="0" cy="0"/>
+        </a:xfrm>
+      </p:grpSpPr>
+      <p:pic>
+        <p:nvPicPr>
+          <p:cNvPr id="2" name="Picture 1"/>
+          <p:cNvPicPr>
+            <a:picLocks noChangeAspect="1"/>
+          </p:cNvPicPr>
+          <p:nvPr/>
+        </p:nvPicPr>
+        <p:blipFill>
+          <a:blip r:embed="rId2"/>
+          <a:stretch>
+            <a:fillRect/>
+          </a:stretch>
+        </p:blipFill>
+        <p:spPr>
+          <a:xfrm>
+            <a:off x="2525486" y="1448619"/>
+            <a:ext cx="6411685" cy="4973483"/>
+          </a:xfrm>
+          <a:prstGeom prst="rect">
+            <a:avLst/>
+          </a:prstGeom>
+        </p:spPr>
+      </p:pic>
+      <p:sp>
+        <p:nvSpPr>
+          <p:cNvPr id="3" name="TextBox 2"/>
+          <p:cNvSpPr txBox="1"/>
+          <p:nvPr/>
+        </p:nvSpPr>
+        <p:spPr>
+          <a:xfrm>
+            <a:off x="3875314" y="435429"/>
+            <a:ext cx="3915239" cy="769441"/>
+          </a:xfrm>
+          <a:prstGeom prst="rect">
+            <a:avLst/>
+          </a:prstGeom>
+          <a:noFill/>
+        </p:spPr>
+        <p:txBody>
+          <a:bodyPr wrap="none" rtlCol="0">
+            <a:spAutoFit/>
+          </a:bodyPr>
+          <a:lstStyle/>
+          <a:p>
+            <a:r>
+              <a:rPr lang="en-GB" sz="4400" dirty="0" smtClean="0"/>
+              <a:t>Do the exercises</a:t>
+            </a:r>
+            <a:endParaRPr lang="en-GB" sz="4400" dirty="0"/>
+          </a:p>
+        </p:txBody>
+      </p:sp>
+    </p:spTree>
+    <p:extLst>
+      <p:ext uri="{BB962C8B-B14F-4D97-AF65-F5344CB8AC3E}">
+        <p14:creationId xmlns:p14="http://schemas.microsoft.com/office/powerpoint/2010/main" val="4091697027"/>
+      </p:ext>
+    </p:extLst>
+  </p:cSld>
+  <p:clrMapOvr>
+    <a:masterClrMapping/>
+  </p:clrMapOvr>
+</p:sld>
+</file>
+
+<file path=ppt/slides/slide15.xml><?xml version="1.0" encoding="utf-8"?>
+<p:sld xmlns:a="http://schemas.openxmlformats.org/drawingml/2006/main" xmlns:r="http://schemas.openxmlformats.org/officeDocument/2006/relationships" xmlns:p="http://schemas.openxmlformats.org/presentationml/2006/main">
+  <p:cSld>
+    <p:spTree>
+      <p:nvGrpSpPr>
+        <p:cNvPr id="1" name=""/>
+        <p:cNvGrpSpPr/>
+        <p:nvPr/>
+      </p:nvGrpSpPr>
+      <p:grpSpPr>
+        <a:xfrm>
+          <a:off x="0" y="0"/>
+          <a:ext cx="0" cy="0"/>
+          <a:chOff x="0" y="0"/>
+          <a:chExt cx="0" cy="0"/>
+        </a:xfrm>
+      </p:grpSpPr>
+      <p:sp>
+        <p:nvSpPr>
+          <p:cNvPr id="2" name="Title 1"/>
+          <p:cNvSpPr>
+            <a:spLocks noGrp="1"/>
+          </p:cNvSpPr>
+          <p:nvPr>
+            <p:ph type="title"/>
+          </p:nvPr>
+        </p:nvSpPr>
+        <p:spPr/>
+        <p:txBody>
+          <a:bodyPr/>
+          <a:lstStyle/>
+          <a:p>
+            <a:r>
+              <a:rPr lang="en-GB" dirty="0" smtClean="0"/>
               <a:t>Yada </a:t>
             </a:r>
             <a:r>
@@ -3160,7 +3737,6 @@
               <a:rPr lang="en-GB" dirty="0" smtClean="0"/>
               <a:t>https://github.com/ScottLogic/SecurityTraining/blob/develop/Attacks/Session%20hijacking%20via%20MITM.md</a:t>
             </a:r>
-            <a:endParaRPr lang="en-GB" dirty="0" smtClean="0"/>
           </a:p>
         </p:txBody>
       </p:sp>
@@ -3298,68 +3874,107 @@
           <a:chExt cx="0" cy="0"/>
         </a:xfrm>
       </p:grpSpPr>
-      <p:sp>
-        <p:nvSpPr>
-          <p:cNvPr id="2" name="Title 1"/>
-          <p:cNvSpPr>
-            <a:spLocks noGrp="1"/>
-          </p:cNvSpPr>
-          <p:nvPr>
-            <p:ph type="title"/>
-          </p:nvPr>
-        </p:nvSpPr>
-        <p:spPr/>
-        <p:txBody>
-          <a:bodyPr/>
-          <a:lstStyle/>
-          <a:p>
-            <a:r>
-              <a:rPr lang="en-GB" dirty="0" smtClean="0"/>
-              <a:t>What is this secret hi-hat middle-man thingy?</a:t>
-            </a:r>
-            <a:endParaRPr lang="en-GB" dirty="0"/>
-          </a:p>
-        </p:txBody>
-      </p:sp>
-      <p:sp>
-        <p:nvSpPr>
-          <p:cNvPr id="3" name="Content Placeholder 2"/>
-          <p:cNvSpPr>
-            <a:spLocks noGrp="1"/>
-          </p:cNvSpPr>
-          <p:nvPr>
-            <p:ph idx="1"/>
-          </p:nvPr>
-        </p:nvSpPr>
-        <p:spPr/>
-        <p:txBody>
-          <a:bodyPr>
-            <a:noAutofit/>
+      <p:pic>
+        <p:nvPicPr>
+          <p:cNvPr id="2" name="Picture 1"/>
+          <p:cNvPicPr>
+            <a:picLocks noChangeAspect="1"/>
+          </p:cNvPicPr>
+          <p:nvPr/>
+        </p:nvPicPr>
+        <p:blipFill>
+          <a:blip r:embed="rId2"/>
+          <a:stretch>
+            <a:fillRect/>
+          </a:stretch>
+        </p:blipFill>
+        <p:spPr>
+          <a:xfrm>
+            <a:off x="719137" y="2623458"/>
+            <a:ext cx="4054472" cy="2307090"/>
+          </a:xfrm>
+          <a:prstGeom prst="rect">
+            <a:avLst/>
+          </a:prstGeom>
+        </p:spPr>
+      </p:pic>
+      <p:pic>
+        <p:nvPicPr>
+          <p:cNvPr id="4" name="Picture 3"/>
+          <p:cNvPicPr>
+            <a:picLocks noChangeAspect="1"/>
+          </p:cNvPicPr>
+          <p:nvPr/>
+        </p:nvPicPr>
+        <p:blipFill>
+          <a:blip r:embed="rId3"/>
+          <a:stretch>
+            <a:fillRect/>
+          </a:stretch>
+        </p:blipFill>
+        <p:spPr>
+          <a:xfrm>
+            <a:off x="6400799" y="1549060"/>
+            <a:ext cx="4827815" cy="3218543"/>
+          </a:xfrm>
+          <a:prstGeom prst="rect">
+            <a:avLst/>
+          </a:prstGeom>
+        </p:spPr>
+      </p:pic>
+      <p:sp>
+        <p:nvSpPr>
+          <p:cNvPr id="6" name="Rectangle 5"/>
+          <p:cNvSpPr/>
+          <p:nvPr/>
+        </p:nvSpPr>
+        <p:spPr>
+          <a:xfrm>
+            <a:off x="719137" y="1302225"/>
+            <a:ext cx="3774303" cy="769441"/>
+          </a:xfrm>
+          <a:prstGeom prst="rect">
+            <a:avLst/>
+          </a:prstGeom>
+        </p:spPr>
+        <p:txBody>
+          <a:bodyPr wrap="none">
+            <a:spAutoFit/>
           </a:bodyPr>
           <a:lstStyle/>
           <a:p>
             <a:r>
-              <a:rPr lang="en-GB" sz="4000" dirty="0"/>
-              <a:t>A session hijack is where you have a session - an ongoing </a:t>
-            </a:r>
-            <a:r>
-              <a:rPr lang="en-GB" sz="4000" dirty="0" smtClean="0"/>
-              <a:t>conversation </a:t>
-            </a:r>
-            <a:r>
-              <a:rPr lang="en-GB" sz="4000" dirty="0"/>
-              <a:t>- with a website, and an attacker gains access to this session, communicating with the site as if he were you. </a:t>
-            </a:r>
-            <a:endParaRPr lang="en-GB" sz="4000" dirty="0" smtClean="0"/>
-          </a:p>
-          <a:p>
-            <a:r>
-              <a:rPr lang="en-GB" sz="4000" dirty="0" smtClean="0"/>
-              <a:t>A </a:t>
-            </a:r>
-            <a:r>
-              <a:rPr lang="en-GB" sz="4000" dirty="0"/>
-              <a:t>man in the middle (MITM) attack is where the attacker can intercept the network communications between your browser and the server, and read, block or modify it. </a:t>
+              <a:rPr lang="en-GB" sz="4400" dirty="0"/>
+              <a:t>It’s not my fault</a:t>
+            </a:r>
+          </a:p>
+        </p:txBody>
+      </p:sp>
+      <p:sp>
+        <p:nvSpPr>
+          <p:cNvPr id="7" name="TextBox 6"/>
+          <p:cNvSpPr txBox="1"/>
+          <p:nvPr/>
+        </p:nvSpPr>
+        <p:spPr>
+          <a:xfrm>
+            <a:off x="7511143" y="5138057"/>
+            <a:ext cx="2774670" cy="769441"/>
+          </a:xfrm>
+          <a:prstGeom prst="rect">
+            <a:avLst/>
+          </a:prstGeom>
+          <a:noFill/>
+        </p:spPr>
+        <p:txBody>
+          <a:bodyPr wrap="none" rtlCol="0">
+            <a:spAutoFit/>
+          </a:bodyPr>
+          <a:lstStyle/>
+          <a:p>
+            <a:r>
+              <a:rPr lang="en-GB" sz="4400" dirty="0" smtClean="0"/>
+              <a:t>It’s this guy</a:t>
             </a:r>
           </a:p>
         </p:txBody>
@@ -3367,7 +3982,7 @@
     </p:spTree>
     <p:extLst>
       <p:ext uri="{BB962C8B-B14F-4D97-AF65-F5344CB8AC3E}">
-        <p14:creationId xmlns:p14="http://schemas.microsoft.com/office/powerpoint/2010/main" val="2572367900"/>
+        <p14:creationId xmlns:p14="http://schemas.microsoft.com/office/powerpoint/2010/main" val="3676037018"/>
       </p:ext>
     </p:extLst>
   </p:cSld>
@@ -3411,7 +4026,7 @@
           <a:p>
             <a:r>
               <a:rPr lang="en-GB" dirty="0" smtClean="0"/>
-              <a:t>Whoa! Is this shit for real?</a:t>
+              <a:t>What is this secret hi-hat middle-man thingy?</a:t>
             </a:r>
             <a:endParaRPr lang="en-GB" dirty="0"/>
           </a:p>
@@ -3434,54 +4049,36 @@
           </a:bodyPr>
           <a:lstStyle/>
           <a:p>
-            <a:pPr marL="0" indent="0">
-              <a:buNone/>
-            </a:pPr>
+            <a:r>
+              <a:rPr lang="en-GB" sz="4000" dirty="0"/>
+              <a:t>A session hijack is where you have a session - an ongoing </a:t>
+            </a:r>
             <a:r>
               <a:rPr lang="en-GB" sz="4000" dirty="0" smtClean="0"/>
-              <a:t>It sure is, yes.</a:t>
-            </a:r>
+              <a:t>conversation </a:t>
+            </a:r>
+            <a:r>
+              <a:rPr lang="en-GB" sz="4000" dirty="0"/>
+              <a:t>- with a website, and an attacker gains access to this session, communicating with the site as if he were you. </a:t>
+            </a:r>
+            <a:endParaRPr lang="en-GB" sz="4000" dirty="0" smtClean="0"/>
           </a:p>
           <a:p>
             <a:r>
               <a:rPr lang="en-GB" sz="4000" dirty="0" smtClean="0"/>
-              <a:t>Your PC may be compromised.</a:t>
-            </a:r>
-          </a:p>
-          <a:p>
-            <a:r>
-              <a:rPr lang="en-GB" sz="4000" dirty="0" smtClean="0"/>
-              <a:t>Your router may be compromised.</a:t>
-            </a:r>
-          </a:p>
-          <a:p>
-            <a:r>
-              <a:rPr lang="en-GB" sz="4000" dirty="0" smtClean="0"/>
-              <a:t>Your wireless network may be compromised.</a:t>
-            </a:r>
-          </a:p>
-          <a:p>
-            <a:r>
-              <a:rPr lang="en-GB" sz="4000" dirty="0" smtClean="0"/>
-              <a:t>Your ISP may compromised.</a:t>
-            </a:r>
-          </a:p>
-          <a:p>
-            <a:pPr marL="0" indent="0">
-              <a:buNone/>
-            </a:pPr>
-            <a:r>
-              <a:rPr lang="en-GB" sz="4000" dirty="0" smtClean="0"/>
-              <a:t>All of these bad things happen, repeatedly.</a:t>
-            </a:r>
-            <a:endParaRPr lang="en-GB" sz="4000" dirty="0"/>
+              <a:t>A </a:t>
+            </a:r>
+            <a:r>
+              <a:rPr lang="en-GB" sz="4000" dirty="0"/>
+              <a:t>man in the middle (MITM) attack is where the attacker can intercept the network communications between your browser and the server, and read, block or modify it. </a:t>
+            </a:r>
           </a:p>
         </p:txBody>
       </p:sp>
     </p:spTree>
     <p:extLst>
       <p:ext uri="{BB962C8B-B14F-4D97-AF65-F5344CB8AC3E}">
-        <p14:creationId xmlns:p14="http://schemas.microsoft.com/office/powerpoint/2010/main" val="696328594"/>
+        <p14:creationId xmlns:p14="http://schemas.microsoft.com/office/powerpoint/2010/main" val="2572367900"/>
       </p:ext>
     </p:extLst>
   </p:cSld>
@@ -3508,155 +4105,34 @@
           <a:chExt cx="0" cy="0"/>
         </a:xfrm>
       </p:grpSpPr>
-      <p:sp>
-        <p:nvSpPr>
-          <p:cNvPr id="2" name="Title 1"/>
-          <p:cNvSpPr>
-            <a:spLocks noGrp="1"/>
-          </p:cNvSpPr>
-          <p:nvPr>
-            <p:ph type="title"/>
-          </p:nvPr>
-        </p:nvSpPr>
-        <p:spPr/>
-        <p:txBody>
-          <a:bodyPr/>
-          <a:lstStyle/>
-          <a:p>
-            <a:r>
-              <a:rPr lang="en-GB" dirty="0" smtClean="0"/>
-              <a:t>Cool. Would you google that for me please?</a:t>
-            </a:r>
-            <a:endParaRPr lang="en-GB" dirty="0"/>
-          </a:p>
-        </p:txBody>
-      </p:sp>
-      <p:sp>
-        <p:nvSpPr>
-          <p:cNvPr id="3" name="Content Placeholder 2"/>
-          <p:cNvSpPr>
-            <a:spLocks noGrp="1"/>
-          </p:cNvSpPr>
-          <p:nvPr>
-            <p:ph idx="1"/>
-          </p:nvPr>
-        </p:nvSpPr>
+      <p:pic>
+        <p:nvPicPr>
+          <p:cNvPr id="2" name="Picture 1"/>
+          <p:cNvPicPr>
+            <a:picLocks noChangeAspect="1"/>
+          </p:cNvPicPr>
+          <p:nvPr/>
+        </p:nvPicPr>
+        <p:blipFill>
+          <a:blip r:embed="rId2"/>
+          <a:stretch>
+            <a:fillRect/>
+          </a:stretch>
+        </p:blipFill>
         <p:spPr>
           <a:xfrm>
-            <a:off x="838200" y="1825624"/>
-            <a:ext cx="10515600" cy="4640489"/>
+            <a:off x="925285" y="33584"/>
+            <a:ext cx="10392573" cy="6824415"/>
           </a:xfrm>
+          <a:prstGeom prst="rect">
+            <a:avLst/>
+          </a:prstGeom>
         </p:spPr>
-        <p:txBody>
-          <a:bodyPr>
-            <a:normAutofit/>
-          </a:bodyPr>
-          <a:lstStyle/>
-          <a:p>
-            <a:pPr marL="0" indent="0">
-              <a:buNone/>
-            </a:pPr>
-            <a:r>
-              <a:rPr lang="en-GB" dirty="0" smtClean="0"/>
-              <a:t>LMGTFY:</a:t>
-            </a:r>
-          </a:p>
-          <a:p>
-            <a:pPr marL="0" indent="0">
-              <a:buNone/>
-            </a:pPr>
-            <a:endParaRPr lang="en-GB" dirty="0" smtClean="0"/>
-          </a:p>
-          <a:p>
-            <a:pPr marL="0" indent="0">
-              <a:buNone/>
-            </a:pPr>
-            <a:r>
-              <a:rPr lang="en-GB" dirty="0" smtClean="0"/>
-              <a:t>http</a:t>
-            </a:r>
-            <a:r>
-              <a:rPr lang="en-GB" dirty="0"/>
-              <a:t>://</a:t>
-            </a:r>
-            <a:r>
-              <a:rPr lang="en-GB" dirty="0" smtClean="0"/>
-              <a:t>www.theregister.co.uk/2015/11/23/dude_youre_getting_pwned</a:t>
-            </a:r>
-            <a:br>
-              <a:rPr lang="en-GB" dirty="0" smtClean="0"/>
-            </a:br>
-            <a:r>
-              <a:rPr lang="en-GB" dirty="0" smtClean="0"/>
-              <a:t/>
-            </a:r>
-            <a:br>
-              <a:rPr lang="en-GB" dirty="0" smtClean="0"/>
-            </a:br>
-            <a:r>
-              <a:rPr lang="en-GB" dirty="0" smtClean="0"/>
-              <a:t>http</a:t>
-            </a:r>
-            <a:r>
-              <a:rPr lang="en-GB" dirty="0"/>
-              <a:t>://</a:t>
-            </a:r>
-            <a:r>
-              <a:rPr lang="en-GB" dirty="0" smtClean="0"/>
-              <a:t>www.theregister.co.uk/2003/11/07/help_my_belkin_router</a:t>
-            </a:r>
-            <a:br>
-              <a:rPr lang="en-GB" dirty="0" smtClean="0"/>
-            </a:br>
-            <a:r>
-              <a:rPr lang="en-GB" dirty="0" smtClean="0"/>
-              <a:t/>
-            </a:r>
-            <a:br>
-              <a:rPr lang="en-GB" dirty="0" smtClean="0"/>
-            </a:br>
-            <a:r>
-              <a:rPr lang="en-GB" dirty="0" smtClean="0"/>
-              <a:t>http</a:t>
-            </a:r>
-            <a:r>
-              <a:rPr lang="en-GB" dirty="0"/>
-              <a:t>://</a:t>
-            </a:r>
-            <a:r>
-              <a:rPr lang="en-GB" dirty="0" smtClean="0"/>
-              <a:t>www.theinquirer.net/inquirer/news/2045528/hundreds-log-rogue-wireless-hotspot-infosec-conference</a:t>
-            </a:r>
-            <a:br>
-              <a:rPr lang="en-GB" dirty="0" smtClean="0"/>
-            </a:br>
-            <a:r>
-              <a:rPr lang="en-GB" dirty="0" smtClean="0"/>
-              <a:t/>
-            </a:r>
-            <a:br>
-              <a:rPr lang="en-GB" dirty="0" smtClean="0"/>
-            </a:br>
-            <a:r>
-              <a:rPr lang="en-GB" dirty="0" smtClean="0"/>
-              <a:t>http</a:t>
-            </a:r>
-            <a:r>
-              <a:rPr lang="en-GB" dirty="0"/>
-              <a:t>://</a:t>
-            </a:r>
-            <a:r>
-              <a:rPr lang="en-GB" dirty="0" smtClean="0"/>
-              <a:t>news.softpedia.com/news/Tunisian-Gov-Is-Primary-Suspect-in-Mass-Theft-of-Gmail-Yahoo-and-Facebook-Logins-176453.shtml</a:t>
-            </a:r>
-            <a:endParaRPr lang="en-GB" dirty="0"/>
-          </a:p>
-        </p:txBody>
-      </p:sp>
+      </p:pic>
     </p:spTree>
     <p:extLst>
       <p:ext uri="{BB962C8B-B14F-4D97-AF65-F5344CB8AC3E}">
-        <p14:creationId xmlns:p14="http://schemas.microsoft.com/office/powerpoint/2010/main" val="1965829389"/>
+        <p14:creationId xmlns:p14="http://schemas.microsoft.com/office/powerpoint/2010/main" val="1786575676"/>
       </p:ext>
     </p:extLst>
   </p:cSld>
@@ -3700,7 +4176,7 @@
           <a:p>
             <a:r>
               <a:rPr lang="en-GB" dirty="0" smtClean="0"/>
-              <a:t>OM(F)G. What should I do?</a:t>
+              <a:t>Whoa! Is this shit for real?</a:t>
             </a:r>
             <a:endParaRPr lang="en-GB" dirty="0"/>
           </a:p>
@@ -3716,92 +4192,61 @@
             <p:ph idx="1"/>
           </p:nvPr>
         </p:nvSpPr>
-        <p:spPr>
-          <a:xfrm>
-            <a:off x="838200" y="1690688"/>
-            <a:ext cx="10515600" cy="4859401"/>
-          </a:xfrm>
-        </p:spPr>
+        <p:spPr/>
         <p:txBody>
           <a:bodyPr>
             <a:noAutofit/>
           </a:bodyPr>
           <a:lstStyle/>
           <a:p>
+            <a:pPr marL="0" indent="0">
+              <a:buNone/>
+            </a:pPr>
             <a:r>
               <a:rPr lang="en-GB" sz="4000" dirty="0" smtClean="0"/>
-              <a:t>Don’t reuse passwords.</a:t>
+              <a:t>It sure is, yes.</a:t>
             </a:r>
           </a:p>
           <a:p>
             <a:r>
               <a:rPr lang="en-GB" sz="4000" dirty="0" smtClean="0"/>
-              <a:t>Understand what data is sensitive.</a:t>
+              <a:t>Your PC may be compromised.</a:t>
             </a:r>
           </a:p>
           <a:p>
             <a:r>
               <a:rPr lang="en-GB" sz="4000" dirty="0" smtClean="0"/>
-              <a:t>Don’t do sensitive stuff on ‘free’ </a:t>
-            </a:r>
-            <a:r>
-              <a:rPr lang="en-GB" sz="4000" dirty="0" err="1" smtClean="0"/>
-              <a:t>wifi</a:t>
-            </a:r>
+              <a:t>Your router may be compromised.</a:t>
+            </a:r>
+          </a:p>
+          <a:p>
             <a:r>
               <a:rPr lang="en-GB" sz="4000" dirty="0" smtClean="0"/>
-              <a:t>.</a:t>
+              <a:t>Your wireless network may be compromised.</a:t>
             </a:r>
           </a:p>
           <a:p>
             <a:r>
               <a:rPr lang="en-GB" sz="4000" dirty="0" smtClean="0"/>
-              <a:t>Use a modern secure browser.</a:t>
-            </a:r>
+              <a:t>Your ISP may compromised.</a:t>
+            </a:r>
+          </a:p>
+          <a:p>
+            <a:pPr marL="0" indent="0">
+              <a:buNone/>
+            </a:pPr>
             <a:r>
               <a:rPr lang="en-GB" sz="4000" dirty="0" smtClean="0"/>
-              <a:t> </a:t>
-            </a:r>
-          </a:p>
-          <a:p>
-            <a:r>
-              <a:rPr lang="en-GB" sz="4000" dirty="0" smtClean="0"/>
-              <a:t>Check your connections.</a:t>
-            </a:r>
-          </a:p>
-          <a:p>
-            <a:pPr marL="0" indent="0">
-              <a:buNone/>
-            </a:pPr>
-            <a:r>
-              <a:rPr lang="en-GB" sz="3600" dirty="0" smtClean="0"/>
-              <a:t>Other things too, but here </a:t>
-            </a:r>
-            <a:r>
-              <a:rPr lang="en-GB" sz="3600" dirty="0" err="1" smtClean="0"/>
-              <a:t>endeth</a:t>
-            </a:r>
-            <a:r>
-              <a:rPr lang="en-GB" sz="3600" dirty="0" smtClean="0"/>
-              <a:t> the first lesson…</a:t>
-            </a:r>
-          </a:p>
-          <a:p>
-            <a:pPr marL="0" indent="0">
-              <a:buNone/>
-            </a:pPr>
-            <a:r>
-              <a:rPr lang="en-GB" sz="3600" dirty="0" smtClean="0"/>
-              <a:t>Any questions?</a:t>
-            </a:r>
-            <a:endParaRPr lang="en-GB" sz="3600" dirty="0"/>
+              <a:t>All of these bad things happen, repeatedly.</a:t>
+            </a:r>
+            <a:endParaRPr lang="en-GB" sz="4000" dirty="0"/>
           </a:p>
         </p:txBody>
       </p:sp>
     </p:spTree>
     <p:extLst>
       <p:ext uri="{BB962C8B-B14F-4D97-AF65-F5344CB8AC3E}">
-        <p14:creationId xmlns:p14="http://schemas.microsoft.com/office/powerpoint/2010/main" val="2100900012"/>
+        <p14:creationId xmlns:p14="http://schemas.microsoft.com/office/powerpoint/2010/main" val="696328594"/>
       </p:ext>
     </p:extLst>
   </p:cSld>
@@ -3845,7 +4290,7 @@
           <a:p>
             <a:r>
               <a:rPr lang="en-GB" dirty="0" smtClean="0"/>
-              <a:t>I’m a developer. Is it all my fault?</a:t>
+              <a:t>Cool. Would you google that for me please?</a:t>
             </a:r>
             <a:endParaRPr lang="en-GB" dirty="0"/>
           </a:p>
@@ -3861,10 +4306,15 @@
             <p:ph idx="1"/>
           </p:nvPr>
         </p:nvSpPr>
-        <p:spPr/>
+        <p:spPr>
+          <a:xfrm>
+            <a:off x="838200" y="1825624"/>
+            <a:ext cx="10515600" cy="4640489"/>
+          </a:xfrm>
+        </p:spPr>
         <p:txBody>
           <a:bodyPr>
-            <a:noAutofit/>
+            <a:normAutofit/>
           </a:bodyPr>
           <a:lstStyle/>
           <a:p>
@@ -3872,35 +4322,106 @@
               <a:buNone/>
             </a:pPr>
             <a:r>
-              <a:rPr lang="en-GB" sz="4000" dirty="0" smtClean="0"/>
-              <a:t>Yes it is (mostly) - these problems exist because of weak application security.</a:t>
-            </a:r>
-          </a:p>
-          <a:p>
-            <a:r>
-              <a:rPr lang="en-GB" sz="4000" dirty="0" smtClean="0"/>
-              <a:t>We need to understand how to design them out.</a:t>
-            </a:r>
-          </a:p>
-          <a:p>
-            <a:r>
-              <a:rPr lang="en-GB" sz="4000" dirty="0" smtClean="0"/>
-              <a:t>We need to know how to review and test for them.</a:t>
-            </a:r>
-          </a:p>
-          <a:p>
-            <a:r>
-              <a:rPr lang="en-GB" sz="4000" dirty="0" smtClean="0"/>
-              <a:t>We need to think of our apps as targets, like a hacker does.</a:t>
-            </a:r>
-            <a:endParaRPr lang="en-GB" sz="4000" dirty="0"/>
+              <a:rPr lang="en-GB" dirty="0" smtClean="0"/>
+              <a:t>LMGTFY:</a:t>
+            </a:r>
+          </a:p>
+          <a:p>
+            <a:pPr marL="0" indent="0">
+              <a:buNone/>
+            </a:pPr>
+            <a:endParaRPr lang="en-GB" dirty="0" smtClean="0"/>
+          </a:p>
+          <a:p>
+            <a:pPr marL="0" indent="0">
+              <a:buNone/>
+            </a:pPr>
+            <a:r>
+              <a:rPr lang="en-GB" dirty="0" smtClean="0"/>
+              <a:t>http</a:t>
+            </a:r>
+            <a:r>
+              <a:rPr lang="en-GB" dirty="0"/>
+              <a:t>://</a:t>
+            </a:r>
+            <a:r>
+              <a:rPr lang="en-GB" dirty="0" smtClean="0"/>
+              <a:t>www.theregister.co.uk/2015/11/23/dude_youre_getting_pwned</a:t>
+            </a:r>
+            <a:br>
+              <a:rPr lang="en-GB" dirty="0" smtClean="0"/>
+            </a:br>
+            <a:r>
+              <a:rPr lang="en-GB" dirty="0" smtClean="0"/>
+              <a:t/>
+            </a:r>
+            <a:br>
+              <a:rPr lang="en-GB" dirty="0" smtClean="0"/>
+            </a:br>
+            <a:r>
+              <a:rPr lang="en-GB" dirty="0" smtClean="0"/>
+              <a:t>http</a:t>
+            </a:r>
+            <a:r>
+              <a:rPr lang="en-GB" dirty="0"/>
+              <a:t>://</a:t>
+            </a:r>
+            <a:r>
+              <a:rPr lang="en-GB" dirty="0" smtClean="0"/>
+              <a:t>www.theregister.co.uk/2003/11/07/help_my_belkin_router</a:t>
+            </a:r>
+            <a:br>
+              <a:rPr lang="en-GB" dirty="0" smtClean="0"/>
+            </a:br>
+            <a:r>
+              <a:rPr lang="en-GB" dirty="0" smtClean="0"/>
+              <a:t/>
+            </a:r>
+            <a:br>
+              <a:rPr lang="en-GB" dirty="0" smtClean="0"/>
+            </a:br>
+            <a:r>
+              <a:rPr lang="en-GB" dirty="0" smtClean="0"/>
+              <a:t>http</a:t>
+            </a:r>
+            <a:r>
+              <a:rPr lang="en-GB" dirty="0"/>
+              <a:t>://</a:t>
+            </a:r>
+            <a:r>
+              <a:rPr lang="en-GB" dirty="0" smtClean="0"/>
+              <a:t>www.theinquirer.net/inquirer/news/2045528/hundreds-log-rogue-wireless-hotspot-infosec-conference</a:t>
+            </a:r>
+            <a:br>
+              <a:rPr lang="en-GB" dirty="0" smtClean="0"/>
+            </a:br>
+            <a:r>
+              <a:rPr lang="en-GB" dirty="0" smtClean="0"/>
+              <a:t/>
+            </a:r>
+            <a:br>
+              <a:rPr lang="en-GB" dirty="0" smtClean="0"/>
+            </a:br>
+            <a:r>
+              <a:rPr lang="en-GB" dirty="0" smtClean="0"/>
+              <a:t>http</a:t>
+            </a:r>
+            <a:r>
+              <a:rPr lang="en-GB" dirty="0"/>
+              <a:t>://</a:t>
+            </a:r>
+            <a:r>
+              <a:rPr lang="en-GB" dirty="0" smtClean="0"/>
+              <a:t>news.softpedia.com/news/Tunisian-Gov-Is-Primary-Suspect-in-Mass-Theft-of-Gmail-Yahoo-and-Facebook-Logins-176453.shtml</a:t>
+            </a:r>
+            <a:endParaRPr lang="en-GB" dirty="0"/>
           </a:p>
         </p:txBody>
       </p:sp>
     </p:spTree>
     <p:extLst>
       <p:ext uri="{BB962C8B-B14F-4D97-AF65-F5344CB8AC3E}">
-        <p14:creationId xmlns:p14="http://schemas.microsoft.com/office/powerpoint/2010/main" val="4131744087"/>
+        <p14:creationId xmlns:p14="http://schemas.microsoft.com/office/powerpoint/2010/main" val="1965829389"/>
       </p:ext>
     </p:extLst>
   </p:cSld>
@@ -3944,7 +4465,7 @@
           <a:p>
             <a:r>
               <a:rPr lang="en-GB" dirty="0" smtClean="0"/>
-              <a:t>What’s this training going to cover?</a:t>
+              <a:t>OM(F)G. What should I do?</a:t>
             </a:r>
             <a:endParaRPr lang="en-GB" dirty="0"/>
           </a:p>
@@ -3962,72 +4483,86 @@
         </p:nvSpPr>
         <p:spPr>
           <a:xfrm>
-            <a:off x="494521" y="1825625"/>
-            <a:ext cx="11196735" cy="4621828"/>
+            <a:off x="838200" y="1690688"/>
+            <a:ext cx="10515600" cy="4859401"/>
           </a:xfrm>
         </p:spPr>
         <p:txBody>
           <a:bodyPr>
-            <a:normAutofit fontScale="92500" lnSpcReduction="10000"/>
+            <a:noAutofit/>
           </a:bodyPr>
           <a:lstStyle/>
           <a:p>
             <a:r>
-              <a:rPr lang="en-GB" sz="3500" dirty="0" smtClean="0"/>
-              <a:t>How the internet works (well, up to a point). </a:t>
-            </a:r>
-          </a:p>
-          <a:p>
-            <a:r>
-              <a:rPr lang="en-GB" sz="3500" dirty="0" smtClean="0"/>
-              <a:t>A couple of ways session management is done, and just how broken it can be. &lt;spoiler: very&gt;</a:t>
-            </a:r>
-          </a:p>
-          <a:p>
-            <a:r>
-              <a:rPr lang="en-GB" sz="3500" dirty="0" smtClean="0"/>
-              <a:t>How to run a session hijack via MITM.</a:t>
-            </a:r>
-          </a:p>
-          <a:p>
-            <a:r>
-              <a:rPr lang="en-GB" sz="3500" dirty="0" smtClean="0"/>
-              <a:t>How to set up tools to test for these vulnerabilities.</a:t>
-            </a:r>
-          </a:p>
-          <a:p>
-            <a:r>
-              <a:rPr lang="en-GB" sz="3500" dirty="0" smtClean="0"/>
-              <a:t>What HTTPS gives you, and how.</a:t>
-            </a:r>
-          </a:p>
-          <a:p>
-            <a:r>
-              <a:rPr lang="en-GB" sz="3500" dirty="0" smtClean="0"/>
-              <a:t>Some simple fixes / mitigations.</a:t>
-            </a:r>
-          </a:p>
-          <a:p>
-            <a:r>
-              <a:rPr lang="en-GB" sz="3500" dirty="0" smtClean="0"/>
-              <a:t>Some less well-known fixes.</a:t>
-            </a:r>
-          </a:p>
-          <a:p>
-            <a:r>
-              <a:rPr lang="en-GB" sz="3500" dirty="0" smtClean="0"/>
-              <a:t>Other stuff.</a:t>
-            </a:r>
-          </a:p>
-          <a:p>
-            <a:endParaRPr lang="en-GB" dirty="0"/>
+              <a:rPr lang="en-GB" sz="4000" dirty="0" smtClean="0"/>
+              <a:t>Don’t reuse passwords.</a:t>
+            </a:r>
+          </a:p>
+          <a:p>
+            <a:r>
+              <a:rPr lang="en-GB" sz="4000" dirty="0" smtClean="0"/>
+              <a:t>Understand what data is sensitive.</a:t>
+            </a:r>
+          </a:p>
+          <a:p>
+            <a:r>
+              <a:rPr lang="en-GB" sz="4000" dirty="0" smtClean="0"/>
+              <a:t>Don’t do sensitive stuff on ‘free’ </a:t>
+            </a:r>
+            <a:r>
+              <a:rPr lang="en-GB" sz="4000" dirty="0" err="1" smtClean="0"/>
+              <a:t>wifi</a:t>
+            </a:r>
+            <a:r>
+              <a:rPr lang="en-GB" sz="4000" dirty="0" smtClean="0"/>
+              <a:t>.</a:t>
+            </a:r>
+          </a:p>
+          <a:p>
+            <a:r>
+              <a:rPr lang="en-GB" sz="4000" dirty="0" smtClean="0"/>
+              <a:t>Use a modern secure browser. </a:t>
+            </a:r>
+          </a:p>
+          <a:p>
+            <a:r>
+              <a:rPr lang="en-GB" sz="4000" dirty="0" smtClean="0"/>
+              <a:t>Check your connections.</a:t>
+            </a:r>
+          </a:p>
+          <a:p>
+            <a:pPr marL="0" indent="0">
+              <a:buNone/>
+            </a:pPr>
+            <a:r>
+              <a:rPr lang="en-GB" sz="3600" dirty="0" smtClean="0"/>
+              <a:t>Other things too, but here </a:t>
+            </a:r>
+            <a:r>
+              <a:rPr lang="en-GB" sz="3600" dirty="0" err="1" smtClean="0"/>
+              <a:t>endeth</a:t>
+            </a:r>
+            <a:r>
+              <a:rPr lang="en-GB" sz="3600" dirty="0" smtClean="0"/>
+              <a:t> the first lesson…</a:t>
+            </a:r>
+          </a:p>
+          <a:p>
+            <a:pPr marL="0" indent="0">
+              <a:buNone/>
+            </a:pPr>
+            <a:r>
+              <a:rPr lang="en-GB" sz="3600" dirty="0" smtClean="0"/>
+              <a:t>Any questions?</a:t>
+            </a:r>
+            <a:endParaRPr lang="en-GB" sz="3600" dirty="0"/>
           </a:p>
         </p:txBody>
       </p:sp>
     </p:spTree>
     <p:extLst>
       <p:ext uri="{BB962C8B-B14F-4D97-AF65-F5344CB8AC3E}">
-        <p14:creationId xmlns:p14="http://schemas.microsoft.com/office/powerpoint/2010/main" val="1973874365"/>
+        <p14:creationId xmlns:p14="http://schemas.microsoft.com/office/powerpoint/2010/main" val="2100900012"/>
       </p:ext>
     </p:extLst>
   </p:cSld>
@@ -4054,104 +4589,63 @@
           <a:chExt cx="0" cy="0"/>
         </a:xfrm>
       </p:grpSpPr>
-      <p:sp>
-        <p:nvSpPr>
-          <p:cNvPr id="2" name="Title 1"/>
-          <p:cNvSpPr>
-            <a:spLocks noGrp="1"/>
-          </p:cNvSpPr>
-          <p:nvPr>
-            <p:ph type="title"/>
-          </p:nvPr>
-        </p:nvSpPr>
-        <p:spPr/>
-        <p:txBody>
-          <a:bodyPr/>
-          <a:lstStyle/>
-          <a:p>
-            <a:r>
-              <a:rPr lang="en-GB" dirty="0" smtClean="0"/>
-              <a:t>How do I use the training material?</a:t>
-            </a:r>
-            <a:endParaRPr lang="en-GB" dirty="0"/>
-          </a:p>
-        </p:txBody>
-      </p:sp>
-      <p:sp>
-        <p:nvSpPr>
-          <p:cNvPr id="3" name="Content Placeholder 2"/>
-          <p:cNvSpPr>
-            <a:spLocks noGrp="1"/>
-          </p:cNvSpPr>
-          <p:nvPr>
-            <p:ph idx="1"/>
-          </p:nvPr>
-        </p:nvSpPr>
-        <p:spPr/>
-        <p:txBody>
-          <a:bodyPr>
-            <a:normAutofit/>
+      <p:pic>
+        <p:nvPicPr>
+          <p:cNvPr id="2" name="Picture 1"/>
+          <p:cNvPicPr>
+            <a:picLocks noChangeAspect="1"/>
+          </p:cNvPicPr>
+          <p:nvPr/>
+        </p:nvPicPr>
+        <p:blipFill>
+          <a:blip r:embed="rId2"/>
+          <a:stretch>
+            <a:fillRect/>
+          </a:stretch>
+        </p:blipFill>
+        <p:spPr>
+          <a:xfrm>
+            <a:off x="2699156" y="1716541"/>
+            <a:ext cx="6486345" cy="4335917"/>
+          </a:xfrm>
+          <a:prstGeom prst="rect">
+            <a:avLst/>
+          </a:prstGeom>
+        </p:spPr>
+      </p:pic>
+      <p:sp>
+        <p:nvSpPr>
+          <p:cNvPr id="3" name="TextBox 2"/>
+          <p:cNvSpPr txBox="1"/>
+          <p:nvPr/>
+        </p:nvSpPr>
+        <p:spPr>
+          <a:xfrm>
+            <a:off x="2152890" y="664030"/>
+            <a:ext cx="7816435" cy="769441"/>
+          </a:xfrm>
+          <a:prstGeom prst="rect">
+            <a:avLst/>
+          </a:prstGeom>
+          <a:noFill/>
+        </p:spPr>
+        <p:txBody>
+          <a:bodyPr wrap="none" rtlCol="0">
+            <a:spAutoFit/>
           </a:bodyPr>
           <a:lstStyle/>
           <a:p>
             <a:r>
-              <a:rPr lang="en-GB" dirty="0" smtClean="0"/>
-              <a:t>It’s hands on. There are a couple of vulnerable sample apps that run in VMs. Hack them then fix them.</a:t>
-            </a:r>
-          </a:p>
-          <a:p>
-            <a:r>
-              <a:rPr lang="en-GB" dirty="0" smtClean="0"/>
-              <a:t>Read the readmes. Read and follow the attack docs (Attacks/*.md).</a:t>
-            </a:r>
-          </a:p>
-          <a:p>
-            <a:r>
-              <a:rPr lang="en-GB" dirty="0" smtClean="0"/>
-              <a:t>Developers: Do the exercises. No, really, you may be surprised.</a:t>
-            </a:r>
-          </a:p>
-          <a:p>
-            <a:r>
-              <a:rPr lang="en-GB" dirty="0" smtClean="0"/>
-              <a:t>Testers: </a:t>
-            </a:r>
-            <a:r>
-              <a:rPr lang="en-GB" dirty="0" smtClean="0"/>
-              <a:t>Do the (testing) exercises. We’ll arrange some extra help.</a:t>
-            </a:r>
-          </a:p>
-          <a:p>
-            <a:r>
-              <a:rPr lang="en-GB" dirty="0" smtClean="0"/>
-              <a:t>Everyone: Ask me when you get stuck, point out my errors and gaps. I’m ‘learning by teaching’ here, so please help me learn too </a:t>
-            </a:r>
-            <a:r>
-              <a:rPr lang="en-GB" dirty="0" smtClean="0">
-                <a:sym typeface="Wingdings" panose="05000000000000000000" pitchFamily="2" charset="2"/>
-              </a:rPr>
-              <a:t></a:t>
-            </a:r>
-            <a:r>
-              <a:rPr lang="en-GB" dirty="0" smtClean="0"/>
-              <a:t>.</a:t>
-            </a:r>
-          </a:p>
-          <a:p>
-            <a:r>
-              <a:rPr lang="en-GB" dirty="0" smtClean="0"/>
-              <a:t>Everyone: It’s a git repo. Please improve it by sending pull requests (talk to me first, though).</a:t>
-            </a:r>
-          </a:p>
-          <a:p>
-            <a:endParaRPr lang="en-GB" dirty="0"/>
+              <a:rPr lang="en-GB" sz="4400" dirty="0" smtClean="0"/>
+              <a:t>Or you could go and live in a cave</a:t>
+            </a:r>
           </a:p>
         </p:txBody>
       </p:sp>
     </p:spTree>
     <p:extLst>
       <p:ext uri="{BB962C8B-B14F-4D97-AF65-F5344CB8AC3E}">
-        <p14:creationId xmlns:p14="http://schemas.microsoft.com/office/powerpoint/2010/main" val="2643770366"/>
+        <p14:creationId xmlns:p14="http://schemas.microsoft.com/office/powerpoint/2010/main" val="144969278"/>
       </p:ext>
     </p:extLst>
   </p:cSld>

</xml_diff>

<commit_message>
Adds skeleton of attack documentation
</commit_message>
<xml_diff>
--- a/Attacks/Session hijacking via MITM.pptx
+++ b/Attacks/Session hijacking via MITM.pptx
@@ -17,9 +17,10 @@
     <p:sldId id="261" r:id="rId11"/>
     <p:sldId id="266" r:id="rId12"/>
     <p:sldId id="262" r:id="rId13"/>
-    <p:sldId id="263" r:id="rId14"/>
-    <p:sldId id="270" r:id="rId15"/>
-    <p:sldId id="264" r:id="rId16"/>
+    <p:sldId id="271" r:id="rId14"/>
+    <p:sldId id="263" r:id="rId15"/>
+    <p:sldId id="270" r:id="rId16"/>
+    <p:sldId id="264" r:id="rId17"/>
   </p:sldIdLst>
   <p:sldSz cx="12192000" cy="6858000"/>
   <p:notesSz cx="6858000" cy="9144000"/>
@@ -257,7 +258,7 @@
           <a:p>
             <a:fld id="{183B8DAC-1B2F-42FF-AD88-17923600ABE0}" type="datetimeFigureOut">
               <a:rPr lang="en-GB" smtClean="0"/>
-              <a:t>02/12/2015</a:t>
+              <a:t>04/12/2015</a:t>
             </a:fld>
             <a:endParaRPr lang="en-GB"/>
           </a:p>
@@ -427,7 +428,7 @@
           <a:p>
             <a:fld id="{183B8DAC-1B2F-42FF-AD88-17923600ABE0}" type="datetimeFigureOut">
               <a:rPr lang="en-GB" smtClean="0"/>
-              <a:t>02/12/2015</a:t>
+              <a:t>04/12/2015</a:t>
             </a:fld>
             <a:endParaRPr lang="en-GB"/>
           </a:p>
@@ -607,7 +608,7 @@
           <a:p>
             <a:fld id="{183B8DAC-1B2F-42FF-AD88-17923600ABE0}" type="datetimeFigureOut">
               <a:rPr lang="en-GB" smtClean="0"/>
-              <a:t>02/12/2015</a:t>
+              <a:t>04/12/2015</a:t>
             </a:fld>
             <a:endParaRPr lang="en-GB"/>
           </a:p>
@@ -777,7 +778,7 @@
           <a:p>
             <a:fld id="{183B8DAC-1B2F-42FF-AD88-17923600ABE0}" type="datetimeFigureOut">
               <a:rPr lang="en-GB" smtClean="0"/>
-              <a:t>02/12/2015</a:t>
+              <a:t>04/12/2015</a:t>
             </a:fld>
             <a:endParaRPr lang="en-GB"/>
           </a:p>
@@ -1023,7 +1024,7 @@
           <a:p>
             <a:fld id="{183B8DAC-1B2F-42FF-AD88-17923600ABE0}" type="datetimeFigureOut">
               <a:rPr lang="en-GB" smtClean="0"/>
-              <a:t>02/12/2015</a:t>
+              <a:t>04/12/2015</a:t>
             </a:fld>
             <a:endParaRPr lang="en-GB"/>
           </a:p>
@@ -1255,7 +1256,7 @@
           <a:p>
             <a:fld id="{183B8DAC-1B2F-42FF-AD88-17923600ABE0}" type="datetimeFigureOut">
               <a:rPr lang="en-GB" smtClean="0"/>
-              <a:t>02/12/2015</a:t>
+              <a:t>04/12/2015</a:t>
             </a:fld>
             <a:endParaRPr lang="en-GB"/>
           </a:p>
@@ -1622,7 +1623,7 @@
           <a:p>
             <a:fld id="{183B8DAC-1B2F-42FF-AD88-17923600ABE0}" type="datetimeFigureOut">
               <a:rPr lang="en-GB" smtClean="0"/>
-              <a:t>02/12/2015</a:t>
+              <a:t>04/12/2015</a:t>
             </a:fld>
             <a:endParaRPr lang="en-GB"/>
           </a:p>
@@ -1740,7 +1741,7 @@
           <a:p>
             <a:fld id="{183B8DAC-1B2F-42FF-AD88-17923600ABE0}" type="datetimeFigureOut">
               <a:rPr lang="en-GB" smtClean="0"/>
-              <a:t>02/12/2015</a:t>
+              <a:t>04/12/2015</a:t>
             </a:fld>
             <a:endParaRPr lang="en-GB"/>
           </a:p>
@@ -1835,7 +1836,7 @@
           <a:p>
             <a:fld id="{183B8DAC-1B2F-42FF-AD88-17923600ABE0}" type="datetimeFigureOut">
               <a:rPr lang="en-GB" smtClean="0"/>
-              <a:t>02/12/2015</a:t>
+              <a:t>04/12/2015</a:t>
             </a:fld>
             <a:endParaRPr lang="en-GB"/>
           </a:p>
@@ -2112,7 +2113,7 @@
           <a:p>
             <a:fld id="{183B8DAC-1B2F-42FF-AD88-17923600ABE0}" type="datetimeFigureOut">
               <a:rPr lang="en-GB" smtClean="0"/>
-              <a:t>02/12/2015</a:t>
+              <a:t>04/12/2015</a:t>
             </a:fld>
             <a:endParaRPr lang="en-GB"/>
           </a:p>
@@ -2365,7 +2366,7 @@
           <a:p>
             <a:fld id="{183B8DAC-1B2F-42FF-AD88-17923600ABE0}" type="datetimeFigureOut">
               <a:rPr lang="en-GB" smtClean="0"/>
-              <a:t>02/12/2015</a:t>
+              <a:t>04/12/2015</a:t>
             </a:fld>
             <a:endParaRPr lang="en-GB"/>
           </a:p>
@@ -2578,7 +2579,7 @@
           <a:p>
             <a:fld id="{183B8DAC-1B2F-42FF-AD88-17923600ABE0}" type="datetimeFigureOut">
               <a:rPr lang="en-GB" smtClean="0"/>
-              <a:t>02/12/2015</a:t>
+              <a:t>04/12/2015</a:t>
             </a:fld>
             <a:endParaRPr lang="en-GB"/>
           </a:p>
@@ -3453,6 +3454,139 @@
           <a:p>
             <a:r>
               <a:rPr lang="en-GB" dirty="0" smtClean="0"/>
+              <a:t>What is HTTPS?</a:t>
+            </a:r>
+            <a:endParaRPr lang="en-GB" dirty="0"/>
+          </a:p>
+        </p:txBody>
+      </p:sp>
+      <p:pic>
+        <p:nvPicPr>
+          <p:cNvPr id="4" name="Content Placeholder 3"/>
+          <p:cNvPicPr>
+            <a:picLocks noGrp="1" noChangeAspect="1"/>
+          </p:cNvPicPr>
+          <p:nvPr>
+            <p:ph idx="1"/>
+          </p:nvPr>
+        </p:nvPicPr>
+        <p:blipFill>
+          <a:blip r:embed="rId2"/>
+          <a:stretch>
+            <a:fillRect/>
+          </a:stretch>
+        </p:blipFill>
+        <p:spPr>
+          <a:xfrm>
+            <a:off x="2992017" y="1690688"/>
+            <a:ext cx="4770158" cy="2489426"/>
+          </a:xfrm>
+          <a:prstGeom prst="rect">
+            <a:avLst/>
+          </a:prstGeom>
+        </p:spPr>
+      </p:pic>
+      <p:sp>
+        <p:nvSpPr>
+          <p:cNvPr id="5" name="TextBox 4"/>
+          <p:cNvSpPr txBox="1"/>
+          <p:nvPr/>
+        </p:nvSpPr>
+        <p:spPr>
+          <a:xfrm>
+            <a:off x="429208" y="4628514"/>
+            <a:ext cx="8490857" cy="2308324"/>
+          </a:xfrm>
+          <a:prstGeom prst="rect">
+            <a:avLst/>
+          </a:prstGeom>
+          <a:noFill/>
+        </p:spPr>
+        <p:txBody>
+          <a:bodyPr wrap="square" rtlCol="0">
+            <a:spAutoFit/>
+          </a:bodyPr>
+          <a:lstStyle/>
+          <a:p>
+            <a:pPr marL="571500" indent="-571500">
+              <a:buFont typeface="Arial" panose="020B0604020202020204" pitchFamily="34" charset="0"/>
+              <a:buChar char="•"/>
+            </a:pPr>
+            <a:r>
+              <a:rPr lang="en-GB" sz="3600" dirty="0" smtClean="0"/>
+              <a:t>Symmetric encryption of message</a:t>
+            </a:r>
+          </a:p>
+          <a:p>
+            <a:pPr marL="571500" indent="-571500">
+              <a:buFont typeface="Arial" panose="020B0604020202020204" pitchFamily="34" charset="0"/>
+              <a:buChar char="•"/>
+            </a:pPr>
+            <a:r>
+              <a:rPr lang="en-GB" sz="3600" dirty="0" smtClean="0"/>
+              <a:t>Key generated by asymmetric encryption, not exposed in transit</a:t>
+            </a:r>
+          </a:p>
+          <a:p>
+            <a:pPr marL="571500" indent="-571500">
+              <a:buFont typeface="Arial" panose="020B0604020202020204" pitchFamily="34" charset="0"/>
+              <a:buChar char="•"/>
+            </a:pPr>
+            <a:r>
+              <a:rPr lang="en-GB" sz="3600" dirty="0" smtClean="0"/>
+              <a:t>Certificates establish chain of trust</a:t>
+            </a:r>
+            <a:endParaRPr lang="en-GB" sz="3600" dirty="0"/>
+          </a:p>
+        </p:txBody>
+      </p:sp>
+    </p:spTree>
+    <p:extLst>
+      <p:ext uri="{BB962C8B-B14F-4D97-AF65-F5344CB8AC3E}">
+        <p14:creationId xmlns:p14="http://schemas.microsoft.com/office/powerpoint/2010/main" val="1700996002"/>
+      </p:ext>
+    </p:extLst>
+  </p:cSld>
+  <p:clrMapOvr>
+    <a:masterClrMapping/>
+  </p:clrMapOvr>
+</p:sld>
+</file>
+
+<file path=ppt/slides/slide14.xml><?xml version="1.0" encoding="utf-8"?>
+<p:sld xmlns:a="http://schemas.openxmlformats.org/drawingml/2006/main" xmlns:r="http://schemas.openxmlformats.org/officeDocument/2006/relationships" xmlns:p="http://schemas.openxmlformats.org/presentationml/2006/main">
+  <p:cSld>
+    <p:spTree>
+      <p:nvGrpSpPr>
+        <p:cNvPr id="1" name=""/>
+        <p:cNvGrpSpPr/>
+        <p:nvPr/>
+      </p:nvGrpSpPr>
+      <p:grpSpPr>
+        <a:xfrm>
+          <a:off x="0" y="0"/>
+          <a:ext cx="0" cy="0"/>
+          <a:chOff x="0" y="0"/>
+          <a:chExt cx="0" cy="0"/>
+        </a:xfrm>
+      </p:grpSpPr>
+      <p:sp>
+        <p:nvSpPr>
+          <p:cNvPr id="2" name="Title 1"/>
+          <p:cNvSpPr>
+            <a:spLocks noGrp="1"/>
+          </p:cNvSpPr>
+          <p:nvPr>
+            <p:ph type="title"/>
+          </p:nvPr>
+        </p:nvSpPr>
+        <p:spPr/>
+        <p:txBody>
+          <a:bodyPr/>
+          <a:lstStyle/>
+          <a:p>
+            <a:r>
+              <a:rPr lang="en-GB" dirty="0" smtClean="0"/>
               <a:t>How do I use the training material?</a:t>
             </a:r>
             <a:endParaRPr lang="en-GB" dirty="0"/>
@@ -3539,7 +3673,7 @@
 </p:sld>
 </file>
 
-<file path=ppt/slides/slide14.xml><?xml version="1.0" encoding="utf-8"?>
+<file path=ppt/slides/slide15.xml><?xml version="1.0" encoding="utf-8"?>
 <p:sld xmlns:a="http://schemas.openxmlformats.org/drawingml/2006/main" xmlns:r="http://schemas.openxmlformats.org/officeDocument/2006/relationships" xmlns:p="http://schemas.openxmlformats.org/presentationml/2006/main">
   <p:cSld>
     <p:spTree>
@@ -3623,7 +3757,7 @@
 </p:sld>
 </file>
 
-<file path=ppt/slides/slide15.xml><?xml version="1.0" encoding="utf-8"?>
+<file path=ppt/slides/slide16.xml><?xml version="1.0" encoding="utf-8"?>
 <p:sld xmlns:a="http://schemas.openxmlformats.org/drawingml/2006/main" xmlns:r="http://schemas.openxmlformats.org/officeDocument/2006/relationships" xmlns:p="http://schemas.openxmlformats.org/presentationml/2006/main">
   <p:cSld>
     <p:spTree>
@@ -4042,7 +4176,12 @@
             <p:ph idx="1"/>
           </p:nvPr>
         </p:nvSpPr>
-        <p:spPr/>
+        <p:spPr>
+          <a:xfrm>
+            <a:off x="838200" y="1573698"/>
+            <a:ext cx="10515600" cy="2830351"/>
+          </a:xfrm>
+        </p:spPr>
         <p:txBody>
           <a:bodyPr>
             <a:noAutofit/>
@@ -4050,27 +4189,136 @@
           <a:lstStyle/>
           <a:p>
             <a:r>
-              <a:rPr lang="en-GB" sz="4000" dirty="0"/>
+              <a:rPr lang="en-GB" sz="1400" dirty="0"/>
               <a:t>A session hijack is where you have a session - an ongoing </a:t>
             </a:r>
             <a:r>
-              <a:rPr lang="en-GB" sz="4000" dirty="0" smtClean="0"/>
+              <a:rPr lang="en-GB" sz="1400" dirty="0" smtClean="0"/>
               <a:t>conversation </a:t>
             </a:r>
             <a:r>
-              <a:rPr lang="en-GB" sz="4000" dirty="0"/>
+              <a:rPr lang="en-GB" sz="1400" dirty="0"/>
               <a:t>- with a website, and an attacker gains access to this session, communicating with the site as if he were you. </a:t>
             </a:r>
-            <a:endParaRPr lang="en-GB" sz="4000" dirty="0" smtClean="0"/>
-          </a:p>
-          <a:p>
-            <a:r>
-              <a:rPr lang="en-GB" sz="4000" dirty="0" smtClean="0"/>
+            <a:endParaRPr lang="en-GB" sz="1400" dirty="0" smtClean="0"/>
+          </a:p>
+          <a:p>
+            <a:r>
+              <a:rPr lang="en-GB" sz="1400" dirty="0" smtClean="0"/>
               <a:t>A </a:t>
             </a:r>
             <a:r>
-              <a:rPr lang="en-GB" sz="4000" dirty="0"/>
+              <a:rPr lang="en-GB" sz="1400" dirty="0"/>
               <a:t>man in the middle (MITM) attack is where the attacker can intercept the network communications between your browser and the server, and read, block or modify it. </a:t>
+            </a:r>
+            <a:endParaRPr lang="en-GB" sz="1400" dirty="0" smtClean="0"/>
+          </a:p>
+          <a:p>
+            <a:pPr marL="0" indent="0">
+              <a:buNone/>
+            </a:pPr>
+            <a:r>
+              <a:rPr lang="en-GB" sz="3200" dirty="0" smtClean="0"/>
+              <a:t>Say what?! Let’s start again.</a:t>
+            </a:r>
+          </a:p>
+          <a:p>
+            <a:pPr marL="0" indent="0">
+              <a:buNone/>
+            </a:pPr>
+            <a:r>
+              <a:rPr lang="en-GB" sz="3200" dirty="0" smtClean="0"/>
+              <a:t>How does Sir Clifford Chatterley correspond with his bank manager when he only has </a:t>
+            </a:r>
+            <a:r>
+              <a:rPr lang="en-GB" sz="3200" dirty="0" err="1" smtClean="0"/>
+              <a:t>Mellors</a:t>
+            </a:r>
+            <a:r>
+              <a:rPr lang="en-GB" sz="3200" dirty="0" smtClean="0"/>
+              <a:t> to carry his mail?</a:t>
+            </a:r>
+            <a:r>
+              <a:rPr lang="en-GB" sz="3600" dirty="0" smtClean="0"/>
+              <a:t> </a:t>
+            </a:r>
+            <a:endParaRPr lang="en-GB" sz="3600" dirty="0"/>
+          </a:p>
+        </p:txBody>
+      </p:sp>
+      <p:pic>
+        <p:nvPicPr>
+          <p:cNvPr id="4" name="Picture 3"/>
+          <p:cNvPicPr>
+            <a:picLocks noChangeAspect="1"/>
+          </p:cNvPicPr>
+          <p:nvPr/>
+        </p:nvPicPr>
+        <p:blipFill>
+          <a:blip r:embed="rId2"/>
+          <a:stretch>
+            <a:fillRect/>
+          </a:stretch>
+        </p:blipFill>
+        <p:spPr>
+          <a:xfrm>
+            <a:off x="979715" y="4289283"/>
+            <a:ext cx="3405673" cy="2046203"/>
+          </a:xfrm>
+          <a:prstGeom prst="rect">
+            <a:avLst/>
+          </a:prstGeom>
+        </p:spPr>
+      </p:pic>
+      <p:pic>
+        <p:nvPicPr>
+          <p:cNvPr id="5" name="Picture 4"/>
+          <p:cNvPicPr>
+            <a:picLocks noChangeAspect="1"/>
+          </p:cNvPicPr>
+          <p:nvPr/>
+        </p:nvPicPr>
+        <p:blipFill>
+          <a:blip r:embed="rId3"/>
+          <a:stretch>
+            <a:fillRect/>
+          </a:stretch>
+        </p:blipFill>
+        <p:spPr>
+          <a:xfrm>
+            <a:off x="7365706" y="4298614"/>
+            <a:ext cx="3373829" cy="2046203"/>
+          </a:xfrm>
+          <a:prstGeom prst="rect">
+            <a:avLst/>
+          </a:prstGeom>
+        </p:spPr>
+      </p:pic>
+      <p:sp>
+        <p:nvSpPr>
+          <p:cNvPr id="6" name="TextBox 5"/>
+          <p:cNvSpPr txBox="1"/>
+          <p:nvPr/>
+        </p:nvSpPr>
+        <p:spPr>
+          <a:xfrm>
+            <a:off x="5066287" y="4925304"/>
+            <a:ext cx="1618520" cy="584775"/>
+          </a:xfrm>
+          <a:prstGeom prst="rect">
+            <a:avLst/>
+          </a:prstGeom>
+          <a:noFill/>
+        </p:spPr>
+        <p:txBody>
+          <a:bodyPr wrap="none" rtlCol="0">
+            <a:spAutoFit/>
+          </a:bodyPr>
+          <a:lstStyle/>
+          <a:p>
+            <a:r>
+              <a:rPr lang="en-GB" sz="3200" dirty="0" smtClean="0"/>
+              <a:t>Trusted?</a:t>
             </a:r>
           </a:p>
         </p:txBody>

</xml_diff>